<commit_message>
Add pdf version of powerpoint
</commit_message>
<xml_diff>
--- a/presentation/R Based Data Projects.pptx
+++ b/presentation/R Based Data Projects.pptx
@@ -10,6 +10,7 @@
     <p:sldId id="258" r:id="rId4"/>
     <p:sldId id="259" r:id="rId5"/>
     <p:sldId id="260" r:id="rId6"/>
+    <p:sldId id="261" r:id="rId7"/>
   </p:sldIdLst>
   <p:sldSz cx="12192000" cy="6858000"/>
   <p:notesSz cx="6858000" cy="9144000"/>
@@ -6949,6 +6950,764 @@
     <p:extLst>
       <p:ext uri="{BB962C8B-B14F-4D97-AF65-F5344CB8AC3E}">
         <p14:creationId xmlns:p14="http://schemas.microsoft.com/office/powerpoint/2010/main" val="1333088290"/>
+      </p:ext>
+    </p:extLst>
+  </p:cSld>
+  <p:clrMapOvr>
+    <a:masterClrMapping/>
+  </p:clrMapOvr>
+  <p:transition spd="slow">
+    <p:push dir="u"/>
+  </p:transition>
+  <p:timing>
+    <p:tnLst>
+      <p:par>
+        <p:cTn id="1" dur="indefinite" restart="never" nodeType="tmRoot">
+          <p:childTnLst>
+            <p:seq concurrent="1" nextAc="seek">
+              <p:cTn id="2" dur="indefinite" nodeType="mainSeq">
+                <p:childTnLst>
+                  <p:par>
+                    <p:cTn id="3" fill="hold">
+                      <p:stCondLst>
+                        <p:cond delay="indefinite"/>
+                      </p:stCondLst>
+                      <p:childTnLst>
+                        <p:par>
+                          <p:cTn id="4" fill="hold">
+                            <p:stCondLst>
+                              <p:cond delay="0"/>
+                            </p:stCondLst>
+                            <p:childTnLst>
+                              <p:par>
+                                <p:cTn id="5" presetID="0" presetClass="path" presetSubtype="0" accel="50000" decel="50000" fill="hold" nodeType="clickEffect">
+                                  <p:stCondLst>
+                                    <p:cond delay="0"/>
+                                  </p:stCondLst>
+                                  <p:childTnLst>
+                                    <p:animMotion origin="layout" path="M -0.07813 0.04213 C -0.09388 0.0456 -0.08086 0.04537 -0.09089 0.04004 C -0.09375 0.03865 -0.09753 0.03912 -0.10039 0.03634 C -0.10326 0.03356 -0.10612 0.03032 -0.10886 0.02708 C -0.1099 0.02569 -0.11081 0.0243 -0.11198 0.02314 C -0.11302 0.02245 -0.11406 0.02199 -0.11511 0.02129 C -0.11693 0.02013 -0.11875 0.01921 -0.12044 0.01759 C -0.13112 0.0081 -0.12083 0.01551 -0.12995 0.00833 C -0.13542 0.00393 -0.15234 -0.00649 -0.15326 -0.00672 C -0.15625 -0.00834 -0.15951 -0.00811 -0.16276 -0.00857 C -0.17292 -0.00811 -0.1832 -0.00834 -0.19336 -0.00672 C -0.19518 -0.00649 -0.19688 -0.00417 -0.19857 -0.00301 C -0.20417 0.00069 -0.19974 -0.00324 -0.20703 0.00254 C -0.20846 0.0037 -0.2099 0.00509 -0.21133 0.00625 C -0.21276 0.00879 -0.21393 0.0118 -0.2155 0.01388 C -0.21641 0.01504 -0.21771 0.01481 -0.21875 0.01574 C -0.21979 0.01666 -0.22083 0.01805 -0.22188 0.01944 C -0.22721 0.02754 -0.2224 0.02407 -0.2293 0.02708 C -0.23034 0.02893 -0.23125 0.03101 -0.23242 0.03263 C -0.23333 0.03402 -0.23451 0.03518 -0.23555 0.03634 C -0.23698 0.03819 -0.23841 0.04004 -0.23984 0.04213 C -0.24089 0.04375 -0.2418 0.04606 -0.24297 0.04768 C -0.24492 0.05046 -0.24727 0.05277 -0.24935 0.05509 C -0.25039 0.05648 -0.25156 0.0574 -0.25248 0.05902 C -0.25833 0.06921 -0.253 0.06041 -0.25886 0.06828 C -0.26068 0.0706 -0.26224 0.07361 -0.26406 0.07592 C -0.26862 0.08101 -0.27409 0.08402 -0.27787 0.09074 C -0.28659 0.10648 -0.27682 0.09004 -0.28841 0.10578 C -0.29935 0.12083 -0.29427 0.11851 -0.30951 0.13402 C -0.31198 0.13657 -0.31458 0.13865 -0.31693 0.14143 C -0.3181 0.14305 -0.31888 0.1456 -0.32005 0.14722 C -0.32175 0.1493 -0.3237 0.15092 -0.32539 0.15277 C -0.32748 0.15532 -0.32956 0.15787 -0.33177 0.16041 L -0.3349 0.16412 C -0.33594 0.16527 -0.33711 0.16643 -0.33802 0.16782 C -0.33984 0.17037 -0.34154 0.17291 -0.34336 0.17546 C -0.3444 0.17662 -0.34557 0.17754 -0.34649 0.17916 C -0.34909 0.18333 -0.35104 0.18888 -0.35391 0.19236 L -0.36654 0.20717 C -0.36758 0.20856 -0.36875 0.20972 -0.36979 0.21111 C -0.37149 0.21342 -0.37305 0.21666 -0.375 0.21851 C -0.37695 0.22037 -0.38138 0.22222 -0.38138 0.22222 C -0.38242 0.22407 -0.3832 0.22662 -0.38451 0.22801 C -0.38581 0.22916 -0.3875 0.2287 -0.3888 0.22986 C -0.39141 0.23194 -0.39362 0.23495 -0.39609 0.23726 C -0.39714 0.23819 -0.39831 0.23819 -0.39935 0.23912 C -0.40156 0.24143 -0.40339 0.24444 -0.4056 0.24676 C -0.40729 0.24838 -0.40925 0.24884 -0.41094 0.25046 C -0.41211 0.25138 -0.41302 0.25324 -0.41406 0.25416 C -0.41758 0.25763 -0.42123 0.26018 -0.42461 0.26365 C -0.42708 0.2662 -0.42956 0.26875 -0.43203 0.27106 C -0.43346 0.27245 -0.4349 0.27338 -0.43633 0.27476 C -0.43737 0.27592 -0.43828 0.27777 -0.43945 0.2787 C -0.44154 0.28032 -0.44375 0.28055 -0.44583 0.2824 C -0.45104 0.28703 -0.44857 0.28518 -0.45326 0.28796 C -0.45599 0.29143 -0.45729 0.29305 -0.46055 0.2956 C -0.46263 0.29699 -0.46498 0.29722 -0.46693 0.2993 C -0.46875 0.30115 -0.47031 0.3037 -0.47227 0.30486 C -0.47565 0.30694 -0.4793 0.3074 -0.48281 0.30856 C -0.48451 0.30926 -0.48633 0.30949 -0.48802 0.31064 C -0.48906 0.31111 -0.49011 0.31203 -0.49128 0.3125 C -0.49401 0.31342 -0.49688 0.31342 -0.49974 0.31435 C -0.50248 0.31527 -0.50521 0.31736 -0.50807 0.31805 L -0.5155 0.3199 C -0.51654 0.3206 -0.51758 0.32129 -0.51875 0.32176 C -0.53854 0.32963 -0.57787 0.32199 -0.58425 0.32176 C -0.59167 0.3199 -0.59623 0.31898 -0.6043 0.3162 C -0.60573 0.31574 -0.60716 0.31504 -0.60846 0.31435 C -0.61029 0.31319 -0.61198 0.31157 -0.6138 0.31064 C -0.61719 0.30856 -0.62083 0.30671 -0.62435 0.30486 C -0.62578 0.30416 -0.62721 0.30393 -0.62852 0.30301 C -0.63034 0.30208 -0.63203 0.3 -0.63386 0.2993 C -0.63763 0.29768 -0.64154 0.29676 -0.64544 0.2956 C -0.65104 0.29166 -0.65677 0.28842 -0.66237 0.28426 C -0.66419 0.28287 -0.66576 0.28009 -0.66758 0.2787 C -0.67761 0.27083 -0.67708 0.27176 -0.68555 0.26921 C -0.6974 0.25879 -0.69232 0.26157 -0.70039 0.25787 C -0.70599 0.25138 -0.70091 0.25648 -0.70781 0.25231 C -0.70964 0.25138 -0.71133 0.24976 -0.71302 0.24861 C -0.71511 0.24722 -0.71732 0.24629 -0.7194 0.2449 C -0.73021 0.23773 -0.71966 0.24444 -0.72891 0.23726 C -0.72995 0.23657 -0.73112 0.23634 -0.73203 0.23541 C -0.74505 0.225 -0.73633 0.23055 -0.74375 0.22615 C -0.74479 0.22407 -0.74557 0.22199 -0.74688 0.22037 C -0.74779 0.21921 -0.74896 0.21944 -0.75 0.21851 C -0.75221 0.21689 -0.75443 0.21527 -0.75638 0.21296 C -0.75755 0.21134 -0.75833 0.20879 -0.75951 0.20717 C -0.76328 0.20301 -0.76732 0.2 -0.77109 0.19606 C -0.77448 0.19259 -0.77748 0.18819 -0.78073 0.18472 C -0.78373 0.18125 -0.7849 0.18101 -0.78802 0.17916 C -0.7905 0.17592 -0.79284 0.17245 -0.79544 0.16967 C -0.79636 0.16875 -0.79766 0.16875 -0.79857 0.16782 C -0.80117 0.16551 -0.80352 0.16273 -0.80599 0.16041 C -0.80742 0.15902 -0.80886 0.15787 -0.81029 0.15648 C -0.81771 0.14907 -0.81289 0.15254 -0.81875 0.14907 L -0.825 0.14143 C -0.82604 0.14027 -0.82734 0.13935 -0.82826 0.13773 C -0.83646 0.12314 -0.83268 0.12801 -0.8388 0.12083 L -0.84297 0.10972 L -0.84505 0.10393 L -0.84609 0.09838 " pathEditMode="relative" ptsTypes="AAAAAAAAAAAAAAAAAAAAAAAAAAAAAAAAAAAAAAAAAAAAAAAAAAAAAAAAAAAAAAAAAAAAAAAAAAAAAAAAAAAAAAAAAAAAAAAAAAAAA">
+                                      <p:cBhvr>
+                                        <p:cTn id="6" dur="2000" fill="hold"/>
+                                        <p:tgtEl>
+                                          <p:spTgt spid="8"/>
+                                        </p:tgtEl>
+                                        <p:attrNameLst>
+                                          <p:attrName>ppt_x</p:attrName>
+                                          <p:attrName>ppt_y</p:attrName>
+                                        </p:attrNameLst>
+                                      </p:cBhvr>
+                                    </p:animMotion>
+                                  </p:childTnLst>
+                                </p:cTn>
+                              </p:par>
+                            </p:childTnLst>
+                          </p:cTn>
+                        </p:par>
+                      </p:childTnLst>
+                    </p:cTn>
+                  </p:par>
+                  <p:par>
+                    <p:cTn id="7" fill="hold">
+                      <p:stCondLst>
+                        <p:cond delay="indefinite"/>
+                      </p:stCondLst>
+                      <p:childTnLst>
+                        <p:par>
+                          <p:cTn id="8" fill="hold">
+                            <p:stCondLst>
+                              <p:cond delay="0"/>
+                            </p:stCondLst>
+                            <p:childTnLst>
+                              <p:par>
+                                <p:cTn id="9" presetID="0" presetClass="path" presetSubtype="0" accel="50000" decel="50000" fill="hold" nodeType="clickEffect">
+                                  <p:stCondLst>
+                                    <p:cond delay="0"/>
+                                  </p:stCondLst>
+                                  <p:childTnLst>
+                                    <p:animMotion origin="layout" path="M -0.04206 0.03171 C -0.09571 0.04352 -0.08321 0.04121 -0.19323 0.04676 C -0.20795 0.04746 -0.22279 0.04421 -0.2375 0.04306 C -0.24141 0.04167 -0.24532 0.04097 -0.24922 0.03912 C -0.25105 0.03843 -0.25261 0.03658 -0.25443 0.03542 C -0.25873 0.03287 -0.25938 0.03403 -0.26394 0.03171 C -0.26615 0.03056 -0.2681 0.02894 -0.27032 0.02801 L -0.27448 0.02616 C -0.29388 0.02847 -0.31342 0.02801 -0.33269 0.03357 C -0.33777 0.03496 -0.34167 0.04259 -0.34636 0.04676 C -0.34805 0.04815 -0.35 0.04884 -0.3517 0.05046 C -0.36042 0.05926 -0.35131 0.05417 -0.36003 0.05787 C -0.3612 0.05996 -0.36198 0.06227 -0.36329 0.06366 C -0.36446 0.06482 -0.36615 0.06458 -0.36745 0.06551 C -0.37852 0.07292 -0.36511 0.06621 -0.37592 0.07107 C -0.378 0.07361 -0.37982 0.07755 -0.3823 0.07871 C -0.38373 0.07917 -0.38516 0.07963 -0.38646 0.08056 C -0.38803 0.08148 -0.38933 0.0831 -0.39076 0.08426 C -0.39245 0.08565 -0.39428 0.08658 -0.39597 0.08796 C -0.3974 0.08912 -0.39883 0.09051 -0.40027 0.0919 C -0.40131 0.09283 -0.40222 0.09468 -0.40339 0.0956 C -0.40469 0.09653 -0.40625 0.09676 -0.40769 0.09746 C -0.41563 0.10695 -0.40547 0.09583 -0.41498 0.10301 C -0.41615 0.10394 -0.41706 0.10579 -0.41823 0.10695 C -0.41993 0.10833 -0.42162 0.10949 -0.42344 0.11065 C -0.42891 0.11389 -0.43581 0.11736 -0.44141 0.12176 C -0.44362 0.12361 -0.44558 0.1257 -0.44779 0.12755 C -0.44883 0.12824 -0.44987 0.12847 -0.45092 0.1294 C -0.45209 0.13033 -0.453 0.13195 -0.45404 0.1331 C -0.45821 0.13727 -0.46355 0.14144 -0.46784 0.14445 C -0.46888 0.14514 -0.46993 0.1456 -0.47097 0.1463 C -0.4724 0.14815 -0.4737 0.15046 -0.47527 0.15185 C -0.47683 0.15347 -0.47878 0.1544 -0.48047 0.15579 C -0.48191 0.15695 -0.48334 0.1581 -0.48477 0.15949 C -0.4892 0.16412 -0.48998 0.16783 -0.49636 0.17083 C -0.49779 0.1713 -0.49922 0.17176 -0.50053 0.17269 C -0.50209 0.17361 -0.50339 0.175 -0.50482 0.17639 C -0.50586 0.17755 -0.50678 0.17917 -0.50795 0.18009 C -0.51381 0.18426 -0.52006 0.18727 -0.52592 0.19144 C -0.53295 0.1963 -0.5293 0.19445 -0.53646 0.19699 C -0.5375 0.19838 -0.53855 0.2 -0.53972 0.2007 C -0.54362 0.20347 -0.54818 0.20486 -0.55235 0.20648 C -0.55404 0.20764 -0.55586 0.20926 -0.55769 0.21019 C -0.56042 0.21181 -0.56329 0.21227 -0.56602 0.21389 C -0.56719 0.21458 -0.56823 0.21528 -0.56928 0.21574 C -0.57201 0.21713 -0.57474 0.21945 -0.57774 0.21968 L -0.6517 0.22153 C -0.653 0.22199 -0.65443 0.22269 -0.65586 0.22338 C -0.65756 0.22408 -0.65938 0.22431 -0.6612 0.22523 C -0.66329 0.22616 -0.66537 0.22778 -0.66745 0.22894 L -0.67071 0.23079 C -0.67175 0.23148 -0.67279 0.23195 -0.67383 0.23264 C -0.67904 0.23727 -0.67657 0.23565 -0.68125 0.23843 C -0.6823 0.24028 -0.68321 0.24259 -0.68438 0.24398 C -0.68529 0.24514 -0.68659 0.24514 -0.6875 0.24583 C -0.68907 0.24699 -0.69037 0.24861 -0.6918 0.24954 C -0.69388 0.25116 -0.69597 0.25208 -0.69818 0.25347 C -0.69922 0.25394 -0.70027 0.25486 -0.70131 0.25533 C -0.70274 0.25602 -0.70417 0.25648 -0.70547 0.25718 C -0.70769 0.25833 -0.70977 0.25972 -0.71185 0.26088 C -0.7129 0.26158 -0.71407 0.26181 -0.71498 0.26273 L -0.72136 0.27037 C -0.7224 0.27153 -0.72331 0.27338 -0.72448 0.27408 C -0.72891 0.27662 -0.72683 0.27477 -0.73086 0.27963 C -0.73152 0.28357 -0.73178 0.28773 -0.73295 0.29097 C -0.73529 0.29722 -0.73503 0.29445 -0.73503 0.29861 " pathEditMode="relative" ptsTypes="AAAAAAAAAAAAAAAAAAAAAAAAAAAAAAAAAAAAAAAAAAAAAAAAAAAAAAAAAAAAAAAAAA">
+                                      <p:cBhvr>
+                                        <p:cTn id="10" dur="2000" fill="hold"/>
+                                        <p:tgtEl>
+                                          <p:spTgt spid="12"/>
+                                        </p:tgtEl>
+                                        <p:attrNameLst>
+                                          <p:attrName>ppt_x</p:attrName>
+                                          <p:attrName>ppt_y</p:attrName>
+                                        </p:attrNameLst>
+                                      </p:cBhvr>
+                                    </p:animMotion>
+                                  </p:childTnLst>
+                                </p:cTn>
+                              </p:par>
+                            </p:childTnLst>
+                          </p:cTn>
+                        </p:par>
+                      </p:childTnLst>
+                    </p:cTn>
+                  </p:par>
+                  <p:par>
+                    <p:cTn id="11" fill="hold">
+                      <p:stCondLst>
+                        <p:cond delay="indefinite"/>
+                      </p:stCondLst>
+                      <p:childTnLst>
+                        <p:par>
+                          <p:cTn id="12" fill="hold">
+                            <p:stCondLst>
+                              <p:cond delay="0"/>
+                            </p:stCondLst>
+                            <p:childTnLst>
+                              <p:par>
+                                <p:cTn id="13" presetID="0" presetClass="path" presetSubtype="0" accel="50000" decel="50000" fill="hold" nodeType="clickEffect">
+                                  <p:stCondLst>
+                                    <p:cond delay="0"/>
+                                  </p:stCondLst>
+                                  <p:childTnLst>
+                                    <p:animMotion origin="layout" path="M -0.05651 0.01528 C -0.05716 0.01135 -0.0582 -3.7037E-6 -0.0608 -0.0037 C -0.06171 -0.00486 -0.06289 -0.00486 -0.06393 -0.00555 C -0.06497 -0.0074 -0.06588 -0.00949 -0.06718 -0.01111 C -0.06888 -0.01342 -0.07434 -0.01875 -0.07669 -0.0206 C -0.0776 -0.02129 -0.07877 -0.02176 -0.07981 -0.02245 C -0.08854 -0.03264 -0.07473 -0.01689 -0.09348 -0.03356 C -0.09973 -0.03912 -0.09674 -0.03703 -0.1052 -0.0412 C -0.10651 -0.04189 -0.10794 -0.04282 -0.10937 -0.04305 C -0.11393 -0.04398 -0.11848 -0.04421 -0.12317 -0.0449 C -0.1263 -0.04537 -0.12942 -0.04629 -0.13268 -0.04676 L -0.18541 -0.0449 C -0.18723 -0.0449 -0.18893 -0.04351 -0.19075 -0.04305 C -0.19492 -0.04213 -0.19921 -0.04189 -0.20338 -0.0412 C -0.20976 -0.04004 -0.21601 -0.03842 -0.22239 -0.0375 C -0.22656 -0.0368 -0.23085 -0.03634 -0.23502 -0.03564 C -0.23723 -0.03518 -0.23932 -0.03426 -0.2414 -0.03356 C -0.24778 -0.03194 -0.25078 -0.03125 -0.25729 -0.02986 L -0.31848 -0.03171 C -0.31966 -0.03194 -0.32057 -0.0331 -0.32161 -0.03356 C -0.33854 -0.04051 -0.32617 -0.0331 -0.34283 -0.0449 C -0.34453 -0.04629 -0.34622 -0.04768 -0.34804 -0.04861 C -0.35013 -0.05 -0.35247 -0.05069 -0.35442 -0.05254 C -0.35585 -0.0537 -0.35729 -0.05486 -0.35859 -0.05625 C -0.3677 -0.06597 -0.36171 -0.0618 -0.36809 -0.06551 C -0.37539 -0.07847 -0.372 -0.07384 -0.3776 -0.08055 C -0.37838 -0.0824 -0.37903 -0.08449 -0.37981 -0.08634 C -0.38072 -0.08889 -0.38203 -0.0912 -0.38294 -0.09375 C -0.38372 -0.09606 -0.38437 -0.09884 -0.38502 -0.10115 C -0.3858 -0.10764 -0.38619 -0.11203 -0.3871 -0.11805 C -0.3875 -0.12014 -0.38789 -0.12199 -0.38815 -0.12384 C -0.38789 -0.13889 -0.38763 -0.15393 -0.3871 -0.16898 C -0.38697 -0.17569 -0.38684 -0.18264 -0.38606 -0.18958 C -0.38541 -0.19537 -0.38424 -0.20092 -0.38294 -0.20648 C -0.38216 -0.20972 -0.38072 -0.21273 -0.37981 -0.21574 C -0.37903 -0.21828 -0.37825 -0.22083 -0.3776 -0.22338 C -0.37486 -0.23472 -0.3789 -0.22268 -0.37447 -0.23842 C -0.37395 -0.24027 -0.3733 -0.24259 -0.37239 -0.24398 C -0.37148 -0.24514 -0.37031 -0.24514 -0.36914 -0.24583 C -0.3621 -0.25833 -0.36979 -0.24652 -0.36289 -0.25347 C -0.36067 -0.25555 -0.35859 -0.25833 -0.35651 -0.26088 C -0.35546 -0.26203 -0.35455 -0.26365 -0.35338 -0.26458 C -0.35195 -0.26597 -0.35052 -0.26736 -0.34908 -0.26828 C -0.34544 -0.27129 -0.34296 -0.27222 -0.33958 -0.27592 C -0.33632 -0.27939 -0.33333 -0.28379 -0.33007 -0.28726 C -0.32838 -0.28912 -0.32656 -0.29074 -0.32486 -0.29282 C -0.32343 -0.29444 -0.32213 -0.29676 -0.32057 -0.29838 C -0.31861 -0.30069 -0.31627 -0.30185 -0.31432 -0.30416 C -0.31302 -0.30555 -0.31223 -0.3081 -0.31106 -0.30972 C -0.31015 -0.31111 -0.30898 -0.31203 -0.30794 -0.31342 C -0.30677 -0.31527 -0.30598 -0.31736 -0.30481 -0.31921 C -0.30377 -0.3206 -0.3026 -0.32152 -0.30156 -0.32291 C -0.30013 -0.32476 -0.29869 -0.32639 -0.29739 -0.32847 C -0.29375 -0.33402 -0.29348 -0.33634 -0.28997 -0.34351 C -0.28906 -0.3456 -0.28776 -0.34699 -0.28684 -0.34907 C -0.28606 -0.35092 -0.28541 -0.35277 -0.28476 -0.35486 C -0.28177 -0.36342 -0.27877 -0.37199 -0.2763 -0.38101 C -0.27552 -0.38356 -0.27486 -0.38611 -0.27408 -0.38865 C -0.27356 -0.39051 -0.27252 -0.39213 -0.272 -0.39421 C -0.26914 -0.40555 -0.27031 -0.40486 -0.26888 -0.41666 C -0.26861 -0.41875 -0.26809 -0.4206 -0.26783 -0.42245 C -0.26588 -0.45555 -0.26445 -0.46041 -0.26679 -0.49375 C -0.26705 -0.49768 -0.26809 -0.50139 -0.26888 -0.50509 C -0.27135 -0.51689 -0.2707 -0.51389 -0.27526 -0.52569 C -0.27734 -0.53125 -0.27825 -0.53449 -0.28151 -0.53889 C -0.28854 -0.54791 -0.2914 -0.55139 -0.29843 -0.55578 C -0.3026 -0.55833 -0.30677 -0.56203 -0.31106 -0.56319 L -0.31848 -0.56504 C -0.31953 -0.56574 -0.32057 -0.56666 -0.32161 -0.56689 C -0.33385 -0.57037 -0.33515 -0.56851 -0.34908 -0.56689 L -0.35859 -0.55578 C -0.35963 -0.55439 -0.36054 -0.55277 -0.36184 -0.55185 L -0.37135 -0.54629 C -0.37239 -0.5456 -0.37343 -0.54467 -0.37447 -0.54444 L -0.3819 -0.54259 C -0.38541 -0.54051 -0.38398 -0.54074 -0.38606 -0.54074 " pathEditMode="relative" ptsTypes="AAAAAAAAAAAAAAAAAAAAAAAAAAAAAAAAAAAAAAAAAAAAAAAAAAAAAAAAAAAAAAAAAAAAAAAAAAAA">
+                                      <p:cBhvr>
+                                        <p:cTn id="14" dur="2000" fill="hold"/>
+                                        <p:tgtEl>
+                                          <p:spTgt spid="10"/>
+                                        </p:tgtEl>
+                                        <p:attrNameLst>
+                                          <p:attrName>ppt_x</p:attrName>
+                                          <p:attrName>ppt_y</p:attrName>
+                                        </p:attrNameLst>
+                                      </p:cBhvr>
+                                    </p:animMotion>
+                                  </p:childTnLst>
+                                </p:cTn>
+                              </p:par>
+                            </p:childTnLst>
+                          </p:cTn>
+                        </p:par>
+                      </p:childTnLst>
+                    </p:cTn>
+                  </p:par>
+                  <p:par>
+                    <p:cTn id="15" fill="hold">
+                      <p:stCondLst>
+                        <p:cond delay="indefinite"/>
+                      </p:stCondLst>
+                      <p:childTnLst>
+                        <p:par>
+                          <p:cTn id="16" fill="hold">
+                            <p:stCondLst>
+                              <p:cond delay="0"/>
+                            </p:stCondLst>
+                            <p:childTnLst>
+                              <p:par>
+                                <p:cTn id="17" presetID="0" presetClass="path" presetSubtype="0" accel="50000" decel="50000" fill="hold" nodeType="clickEffect">
+                                  <p:stCondLst>
+                                    <p:cond delay="0"/>
+                                  </p:stCondLst>
+                                  <p:childTnLst>
+                                    <p:animMotion origin="layout" path="M -0.06133 -0.00486 C -0.07553 -0.00209 -0.07162 -0.00185 -0.09089 -0.00486 C -0.09232 -0.00509 -0.09362 -0.00648 -0.09506 -0.00671 C -0.10274 -0.00787 -0.11055 -0.00787 -0.11836 -0.00857 L -0.17435 -0.00671 C -0.17579 -0.00671 -0.17722 -0.00579 -0.17852 -0.00486 C -0.18555 -0.00023 -0.19662 0.01018 -0.20183 0.01574 C -0.20352 0.01759 -0.20521 0.01967 -0.20704 0.02153 C -0.20977 0.02407 -0.21276 0.02592 -0.2155 0.02893 C -0.21745 0.03102 -0.21901 0.03403 -0.22084 0.03657 C -0.22279 0.03912 -0.22513 0.0412 -0.22709 0.04398 C -0.2293 0.04699 -0.23125 0.05046 -0.23347 0.05347 C -0.2362 0.05671 -0.2392 0.05926 -0.24193 0.06273 C -0.24636 0.06852 -0.2504 0.07523 -0.25456 0.08148 C -0.25665 0.08472 -0.25899 0.0875 -0.26094 0.09097 C -0.26263 0.09398 -0.26433 0.09745 -0.26615 0.10023 C -0.27071 0.10741 -0.27566 0.11342 -0.27995 0.12106 C -0.28165 0.12407 -0.28334 0.12731 -0.28516 0.13032 C -0.29441 0.14537 -0.28842 0.13449 -0.29792 0.14722 C -0.30013 0.15023 -0.30222 0.15324 -0.30417 0.15671 C -0.30612 0.15972 -0.30782 0.16273 -0.30951 0.16597 C -0.31133 0.16967 -0.31276 0.17384 -0.31485 0.17731 C -0.31875 0.18403 -0.32318 0.18981 -0.32748 0.19606 C -0.32917 0.19861 -0.33125 0.20046 -0.33282 0.20347 C -0.33451 0.20741 -0.3362 0.21111 -0.33803 0.21481 C -0.33907 0.2169 -0.34024 0.21852 -0.34115 0.22037 C -0.34467 0.22731 -0.3461 0.23171 -0.34961 0.23727 C -0.35131 0.24004 -0.35326 0.24236 -0.35495 0.24491 C -0.3642 0.25926 -0.35157 0.24074 -0.36133 0.2581 C -0.36211 0.25972 -0.36342 0.26041 -0.36446 0.2618 C -0.37253 0.27384 -0.3629 0.2618 -0.37084 0.27106 L -0.76797 0.20555 C -0.7711 0.20486 -0.77357 0.20023 -0.77644 0.19791 C -0.85 0.14074 -0.6724 0.28287 -0.79961 0.17916 C -0.86745 0.12407 -0.77709 0.20023 -0.8155 0.16597 C -0.81719 0.16458 -0.81928 0.16412 -0.82084 0.16227 C -0.84219 0.13657 -0.86303 0.10972 -0.88412 0.08333 C -0.89011 0.06759 -0.8806 0.09259 -0.89154 0.06643 C -0.8931 0.06296 -0.89454 0.05903 -0.89584 0.05532 C -0.89662 0.05278 -0.89714 0.05023 -0.89792 0.04768 C -0.89922 0.04375 -0.90092 0.04051 -0.90209 0.03657 C -0.90274 0.03472 -0.90261 0.03264 -0.90313 0.03079 C -0.90547 0.02315 -0.90808 0.01574 -0.91055 0.00833 C -0.91198 0.00393 -0.91355 -0.00023 -0.91485 -0.00486 L -0.91901 -0.01991 C -0.92383 -0.12107 -0.93868 -0.19028 -0.92527 -0.27709 C -0.92331 -0.28982 -0.92045 -0.30209 -0.91797 -0.31459 C -0.91524 -0.34421 -0.9142 -0.35972 -0.90105 -0.39352 C -0.89792 -0.40162 -0.8948 -0.40996 -0.89154 -0.41806 C -0.88829 -0.42616 -0.88165 -0.43912 -0.87787 -0.44421 C -0.86133 -0.46644 -0.8448 -0.48866 -0.82709 -0.5081 C -0.8254 -0.50996 -0.80691 -0.52315 -0.79961 -0.52685 C -0.78881 -0.53241 -0.76316 -0.5456 -0.75105 -0.54931 C -0.74089 -0.55255 -0.7306 -0.5544 -0.72045 -0.55695 C -0.71732 -0.55764 -0.71407 -0.55834 -0.71094 -0.5588 L -0.62006 -0.57014 L -0.4004 -0.55116 C -0.39375 -0.55046 -0.38763 -0.54537 -0.38138 -0.5419 C -0.37175 -0.53658 -0.36224 -0.53102 -0.35287 -0.525 C -0.33776 -0.51551 -0.30821 -0.47986 -0.30534 -0.47616 C -0.30144 -0.47107 -0.29766 -0.46574 -0.29362 -0.46111 C -0.28542 -0.45185 -0.27683 -0.44352 -0.26836 -0.43496 C -0.26693 -0.43357 -0.26537 -0.43264 -0.26407 -0.43102 C -0.25938 -0.42523 -0.25482 -0.41875 -0.2504 -0.41227 C -0.24922 -0.41065 -0.24818 -0.4088 -0.24714 -0.40671 C -0.23256 -0.37639 -0.22123 -0.34676 -0.20912 -0.31088 C -0.19727 -0.2757 -0.19597 -0.27338 -0.18594 -0.23773 C -0.18503 -0.23472 -0.18451 -0.23148 -0.18386 -0.22824 C -0.17618 -0.15255 -0.17748 -0.18519 -0.17956 -0.08935 C -0.17969 -0.08611 -0.18008 -0.0831 -0.1806 -0.07986 C -0.18295 -0.06783 -0.18581 -0.05625 -0.18803 -0.04421 C -0.19362 -0.01459 -0.18816 -0.04005 -0.19649 -0.01042 C -0.19805 -0.00486 -0.19883 0.00116 -0.20066 0.00648 C -0.20625 0.02245 -0.21263 0.03773 -0.21862 0.05347 C -0.22045 0.05787 -0.22175 0.06273 -0.22396 0.06643 C -0.22644 0.07083 -0.22904 0.075 -0.23138 0.07963 C -0.23321 0.08333 -0.2349 0.08704 -0.23659 0.09097 C -0.23737 0.09259 -0.2379 0.09491 -0.23868 0.09653 C -0.24636 0.11204 -0.24128 0.10046 -0.24818 0.11157 C -0.25013 0.11458 -0.25157 0.11829 -0.25352 0.12106 C -0.25821 0.12708 -0.26329 0.13241 -0.26836 0.13796 C -0.27071 0.14051 -0.27331 0.14259 -0.27566 0.14537 C -0.278 0.14815 -0.27982 0.15208 -0.28204 0.15486 C -0.28503 0.15833 -0.28855 0.16065 -0.29154 0.16412 C -0.29415 0.1669 -0.29636 0.1706 -0.29896 0.17361 C -0.30586 0.18125 -0.31355 0.18727 -0.32006 0.19606 C -0.32995 0.20926 -0.32032 0.19676 -0.34011 0.21852 C -0.34232 0.22106 -0.34428 0.22384 -0.34649 0.22616 C -0.35066 0.23055 -0.35495 0.23472 -0.35912 0.23935 C -0.37266 0.25393 -0.35886 0.23958 -0.37084 0.25416 C -0.37357 0.25764 -0.37657 0.26018 -0.37917 0.26366 C -0.40508 0.2956 -0.38516 0.275 -0.41615 0.30694 C -0.42253 0.31319 -0.42852 0.3206 -0.43516 0.32569 C -0.44362 0.33194 -0.4517 0.34051 -0.46055 0.34444 C -0.50092 0.3618 -0.5349 0.36551 -0.57566 0.37268 C -0.6043 0.36435 -0.6336 0.36273 -0.66133 0.34815 C -0.67956 0.33866 -0.69857 0.32523 -0.71198 0.30116 C -0.71342 0.29861 -0.71459 0.29583 -0.71628 0.29375 C -0.71745 0.29213 -0.71915 0.29143 -0.72045 0.29004 C -0.7293 0.27963 -0.73829 0.26921 -0.74688 0.2581 C -0.80821 0.17801 -0.75521 0.24722 -0.77852 0.21111 C -0.85612 0.09028 -0.79024 0.19722 -0.82605 0.13588 C -0.83165 0.12639 -0.83737 0.11736 -0.84297 0.10787 C -0.8448 0.10486 -0.84662 0.10185 -0.84831 0.09838 C -0.85313 0.08842 -0.8586 0.07916 -0.86303 0.06829 C -0.86862 0.05463 -0.87435 0.04097 -0.87995 0.02708 C -0.88217 0.02153 -0.88399 0.01551 -0.88633 0.01018 C -0.89506 -0.01042 -0.90118 -0.02315 -0.90847 -0.04421 C -0.91576 -0.06528 -0.92409 -0.08542 -0.92943 -0.1081 C -0.93099 -0.11482 -0.93555 -0.13241 -0.93685 -0.1419 C -0.94063 -0.16829 -0.93594 -0.14259 -0.93894 -0.1588 C -0.93933 -0.1625 -0.93985 -0.16621 -0.93998 -0.17014 C -0.94388 -0.24005 -0.94388 -0.25787 -0.93373 -0.34653 C -0.93191 -0.36227 -0.91915 -0.41597 -0.91276 -0.43866 C -0.90443 -0.46759 -0.89753 -0.49792 -0.88737 -0.525 C -0.88308 -0.53634 -0.88008 -0.54931 -0.87461 -0.5588 C -0.853 -0.59699 -0.87553 -0.55996 -0.85248 -0.59051 C -0.85053 -0.59306 -0.84909 -0.59699 -0.84727 -0.59977 C -0.84206 -0.60718 -0.83672 -0.61389 -0.83138 -0.6206 C -0.82657 -0.62639 -0.82162 -0.63195 -0.81654 -0.6375 C -0.81524 -0.63889 -0.81381 -0.64028 -0.81237 -0.64121 C -0.80717 -0.64468 -0.80196 -0.64908 -0.79649 -0.65046 C -0.78737 -0.65301 -0.77813 -0.65185 -0.76901 -0.65255 C -0.71941 -0.64815 -0.66967 -0.64584 -0.62006 -0.63935 C -0.61667 -0.63889 -0.61381 -0.6338 -0.61055 -0.63171 C -0.5987 -0.62431 -0.58646 -0.61875 -0.57461 -0.61111 C -0.56498 -0.60486 -0.5556 -0.59769 -0.5461 -0.59051 C -0.5224 -0.57269 -0.50092 -0.55324 -0.47852 -0.52871 L -0.42357 -0.46875 L -0.40456 -0.44792 L -0.38451 -0.42546 C -0.3681 -0.40695 -0.34961 -0.38727 -0.3349 -0.36528 C -0.30417 -0.31991 -0.35612 -0.39792 -0.32214 -0.34283 C -0.31641 -0.33357 -0.31003 -0.3257 -0.30417 -0.31667 C -0.2974 -0.30556 -0.29102 -0.29375 -0.28412 -0.28264 C -0.278 -0.27292 -0.27123 -0.26435 -0.26511 -0.25463 C -0.26381 -0.25255 -0.26316 -0.24954 -0.26198 -0.24699 C -0.26094 -0.24514 -0.25977 -0.24352 -0.25886 -0.24144 C -0.25795 -0.23982 -0.25743 -0.23773 -0.25665 -0.23588 C -0.25573 -0.23334 -0.2543 -0.23102 -0.25352 -0.22824 C -0.25183 -0.22292 -0.25092 -0.2169 -0.24935 -0.21134 C -0.24844 -0.2081 -0.24701 -0.20533 -0.2461 -0.20209 C -0.23816 -0.17361 -0.24401 -0.19005 -0.23659 -0.16829 C -0.23594 -0.16621 -0.23529 -0.16435 -0.23451 -0.1625 C -0.23034 -0.15371 -0.22592 -0.14514 -0.22188 -0.13634 C -0.20925 -0.10903 -0.23685 -0.16482 -0.2155 -0.1213 C -0.21446 -0.11921 -0.21329 -0.11783 -0.21237 -0.11574 C -0.20521 -0.09931 -0.21081 -0.10834 -0.20287 -0.08935 C -0.20066 -0.08426 -0.19857 -0.0794 -0.19649 -0.07431 C -0.19401 -0.06806 -0.1918 -0.06134 -0.18907 -0.05556 C -0.18737 -0.05185 -0.18542 -0.04815 -0.18386 -0.04421 C -0.17839 -0.03195 -0.17422 -0.01783 -0.16797 -0.00671 C -0.16316 0.00185 -0.16459 -0.00232 -0.16263 0.00463 " pathEditMode="relative" ptsTypes="AAAAAAAAAAAAAAAAAAAAAAAAAAAAAAAAAAAAAAAAAAAAAAAAAAAAAAAAAAAAAAAAAAAAAAAAAAAAAAAAAAAAAAAAAAAAAAAAAAAAAAAAAAAAAAAAAAAAAAAAAAAAAAAAAAAAAAAAAAAAAAAAAAAAAAAAA">
+                                      <p:cBhvr>
+                                        <p:cTn id="18" dur="6500" fill="hold"/>
+                                        <p:tgtEl>
+                                          <p:spTgt spid="6"/>
+                                        </p:tgtEl>
+                                        <p:attrNameLst>
+                                          <p:attrName>ppt_x</p:attrName>
+                                          <p:attrName>ppt_y</p:attrName>
+                                        </p:attrNameLst>
+                                      </p:cBhvr>
+                                    </p:animMotion>
+                                  </p:childTnLst>
+                                </p:cTn>
+                              </p:par>
+                            </p:childTnLst>
+                          </p:cTn>
+                        </p:par>
+                      </p:childTnLst>
+                    </p:cTn>
+                  </p:par>
+                </p:childTnLst>
+              </p:cTn>
+              <p:prevCondLst>
+                <p:cond evt="onPrev" delay="0">
+                  <p:tgtEl>
+                    <p:sldTgt/>
+                  </p:tgtEl>
+                </p:cond>
+              </p:prevCondLst>
+              <p:nextCondLst>
+                <p:cond evt="onNext" delay="0">
+                  <p:tgtEl>
+                    <p:sldTgt/>
+                  </p:tgtEl>
+                </p:cond>
+              </p:nextCondLst>
+            </p:seq>
+          </p:childTnLst>
+        </p:cTn>
+      </p:par>
+    </p:tnLst>
+  </p:timing>
+</p:sld>
+</file>
+
+<file path=ppt/slides/slide6.xml><?xml version="1.0" encoding="utf-8"?>
+<p:sld xmlns:a="http://schemas.openxmlformats.org/drawingml/2006/main" xmlns:r="http://schemas.openxmlformats.org/officeDocument/2006/relationships" xmlns:p="http://schemas.openxmlformats.org/presentationml/2006/main">
+  <p:cSld>
+    <p:spTree>
+      <p:nvGrpSpPr>
+        <p:cNvPr id="1" name=""/>
+        <p:cNvGrpSpPr/>
+        <p:nvPr/>
+      </p:nvGrpSpPr>
+      <p:grpSpPr>
+        <a:xfrm>
+          <a:off x="0" y="0"/>
+          <a:ext cx="0" cy="0"/>
+          <a:chOff x="0" y="0"/>
+          <a:chExt cx="0" cy="0"/>
+        </a:xfrm>
+      </p:grpSpPr>
+      <p:sp>
+        <p:nvSpPr>
+          <p:cNvPr id="2" name="Title 1">
+            <a:extLst>
+              <a:ext uri="{FF2B5EF4-FFF2-40B4-BE49-F238E27FC236}">
+                <a16:creationId xmlns:a16="http://schemas.microsoft.com/office/drawing/2014/main" id="{0F95F2E7-6DE3-CD6B-AC39-CBDEA9441317}"/>
+              </a:ext>
+            </a:extLst>
+          </p:cNvPr>
+          <p:cNvSpPr>
+            <a:spLocks noGrp="1"/>
+          </p:cNvSpPr>
+          <p:nvPr>
+            <p:ph type="ctrTitle"/>
+          </p:nvPr>
+        </p:nvSpPr>
+        <p:spPr>
+          <a:xfrm>
+            <a:off x="248653" y="0"/>
+            <a:ext cx="9144000" cy="1460417"/>
+          </a:xfrm>
+        </p:spPr>
+        <p:txBody>
+          <a:bodyPr anchor="ctr">
+            <a:normAutofit/>
+          </a:bodyPr>
+          <a:lstStyle/>
+          <a:p>
+            <a:pPr algn="l"/>
+            <a:r>
+              <a:rPr lang="en-US" sz="3200" b="1" dirty="0">
+                <a:solidFill>
+                  <a:schemeClr val="bg2">
+                    <a:lumMod val="50000"/>
+                  </a:schemeClr>
+                </a:solidFill>
+                <a:latin typeface="Hurme Geometric Sans 4" panose="020B0500020000000000" pitchFamily="34" charset="77"/>
+              </a:rPr>
+              <a:t>Helpful Commands</a:t>
+            </a:r>
+          </a:p>
+        </p:txBody>
+      </p:sp>
+      <p:sp>
+        <p:nvSpPr>
+          <p:cNvPr id="4" name="TextBox 3">
+            <a:extLst>
+              <a:ext uri="{FF2B5EF4-FFF2-40B4-BE49-F238E27FC236}">
+                <a16:creationId xmlns:a16="http://schemas.microsoft.com/office/drawing/2014/main" id="{2DDD319E-D586-AE10-8E0A-6EBE63509906}"/>
+              </a:ext>
+            </a:extLst>
+          </p:cNvPr>
+          <p:cNvSpPr txBox="1"/>
+          <p:nvPr/>
+        </p:nvSpPr>
+        <p:spPr>
+          <a:xfrm>
+            <a:off x="0" y="6304002"/>
+            <a:ext cx="5678906" cy="553998"/>
+          </a:xfrm>
+          <a:prstGeom prst="rect">
+            <a:avLst/>
+          </a:prstGeom>
+          <a:noFill/>
+        </p:spPr>
+        <p:txBody>
+          <a:bodyPr wrap="square" rtlCol="0">
+            <a:spAutoFit/>
+          </a:bodyPr>
+          <a:lstStyle/>
+          <a:p>
+            <a:r>
+              <a:rPr lang="en-US" sz="1000" dirty="0">
+                <a:solidFill>
+                  <a:schemeClr val="bg2">
+                    <a:lumMod val="50000"/>
+                  </a:schemeClr>
+                </a:solidFill>
+              </a:rPr>
+              <a:t>Github Repo: https://github.com/ty-sanders/Deploying-R-Based-Data-Solutions-on-AWS</a:t>
+            </a:r>
+          </a:p>
+          <a:p>
+            <a:r>
+              <a:rPr lang="en-US" sz="1000" dirty="0">
+                <a:solidFill>
+                  <a:schemeClr val="bg2">
+                    <a:lumMod val="50000"/>
+                  </a:schemeClr>
+                </a:solidFill>
+              </a:rPr>
+              <a:t>LinkedIn: https://</a:t>
+            </a:r>
+            <a:r>
+              <a:rPr lang="en-US" sz="1000" dirty="0" err="1">
+                <a:solidFill>
+                  <a:schemeClr val="bg2">
+                    <a:lumMod val="50000"/>
+                  </a:schemeClr>
+                </a:solidFill>
+              </a:rPr>
+              <a:t>www.linkedin.com</a:t>
+            </a:r>
+            <a:r>
+              <a:rPr lang="en-US" sz="1000" dirty="0">
+                <a:solidFill>
+                  <a:schemeClr val="bg2">
+                    <a:lumMod val="50000"/>
+                  </a:schemeClr>
+                </a:solidFill>
+              </a:rPr>
+              <a:t>/in/tyler-sanders-8275b5150/</a:t>
+            </a:r>
+          </a:p>
+          <a:p>
+            <a:r>
+              <a:rPr lang="en-US" sz="1000" dirty="0">
+                <a:solidFill>
+                  <a:schemeClr val="bg2">
+                    <a:lumMod val="50000"/>
+                  </a:schemeClr>
+                </a:solidFill>
+              </a:rPr>
+              <a:t>Company Profile: https://</a:t>
+            </a:r>
+            <a:r>
+              <a:rPr lang="en-US" sz="1000" dirty="0" err="1">
+                <a:solidFill>
+                  <a:schemeClr val="bg2">
+                    <a:lumMod val="50000"/>
+                  </a:schemeClr>
+                </a:solidFill>
+              </a:rPr>
+              <a:t>www.redoakstrategic.com</a:t>
+            </a:r>
+            <a:r>
+              <a:rPr lang="en-US" sz="1000" dirty="0">
+                <a:solidFill>
+                  <a:schemeClr val="bg2">
+                    <a:lumMod val="50000"/>
+                  </a:schemeClr>
+                </a:solidFill>
+              </a:rPr>
+              <a:t>/about</a:t>
+            </a:r>
+          </a:p>
+        </p:txBody>
+      </p:sp>
+      <p:pic>
+        <p:nvPicPr>
+          <p:cNvPr id="6" name="Picture 5" descr="A blue and black logo&#10;&#10;Description automatically generated">
+            <a:extLst>
+              <a:ext uri="{FF2B5EF4-FFF2-40B4-BE49-F238E27FC236}">
+                <a16:creationId xmlns:a16="http://schemas.microsoft.com/office/drawing/2014/main" id="{A843657B-CF3D-AAA9-20C7-6932849D0E91}"/>
+              </a:ext>
+            </a:extLst>
+          </p:cNvPr>
+          <p:cNvPicPr>
+            <a:picLocks noChangeAspect="1"/>
+          </p:cNvPicPr>
+          <p:nvPr/>
+        </p:nvPicPr>
+        <p:blipFill>
+          <a:blip r:embed="rId2"/>
+          <a:stretch>
+            <a:fillRect/>
+          </a:stretch>
+        </p:blipFill>
+        <p:spPr>
+          <a:xfrm>
+            <a:off x="10293016" y="3260054"/>
+            <a:ext cx="1898984" cy="1426241"/>
+          </a:xfrm>
+          <a:prstGeom prst="rect">
+            <a:avLst/>
+          </a:prstGeom>
+        </p:spPr>
+      </p:pic>
+      <p:pic>
+        <p:nvPicPr>
+          <p:cNvPr id="8" name="Picture 7" descr="A white cloud with a logo&#10;&#10;Description automatically generated">
+            <a:extLst>
+              <a:ext uri="{FF2B5EF4-FFF2-40B4-BE49-F238E27FC236}">
+                <a16:creationId xmlns:a16="http://schemas.microsoft.com/office/drawing/2014/main" id="{5C19E56F-371D-F9FB-6E00-03E3A0459608}"/>
+              </a:ext>
+            </a:extLst>
+          </p:cNvPr>
+          <p:cNvPicPr>
+            <a:picLocks noChangeAspect="1"/>
+          </p:cNvPicPr>
+          <p:nvPr/>
+        </p:nvPicPr>
+        <p:blipFill>
+          <a:blip r:embed="rId3"/>
+          <a:stretch>
+            <a:fillRect/>
+          </a:stretch>
+        </p:blipFill>
+        <p:spPr>
+          <a:xfrm>
+            <a:off x="10384836" y="1702340"/>
+            <a:ext cx="1765468" cy="1324101"/>
+          </a:xfrm>
+          <a:prstGeom prst="rect">
+            <a:avLst/>
+          </a:prstGeom>
+        </p:spPr>
+      </p:pic>
+      <p:pic>
+        <p:nvPicPr>
+          <p:cNvPr id="10" name="Picture 9" descr="A blue and white logo&#10;&#10;Description automatically generated">
+            <a:extLst>
+              <a:ext uri="{FF2B5EF4-FFF2-40B4-BE49-F238E27FC236}">
+                <a16:creationId xmlns:a16="http://schemas.microsoft.com/office/drawing/2014/main" id="{92DBDB6A-E5E3-A497-4276-370DA14FDC39}"/>
+              </a:ext>
+            </a:extLst>
+          </p:cNvPr>
+          <p:cNvPicPr>
+            <a:picLocks noChangeAspect="1"/>
+          </p:cNvPicPr>
+          <p:nvPr/>
+        </p:nvPicPr>
+        <p:blipFill rotWithShape="1">
+          <a:blip r:embed="rId4"/>
+          <a:srcRect l="33186" t="32618" r="31541" b="32109"/>
+          <a:stretch/>
+        </p:blipFill>
+        <p:spPr>
+          <a:xfrm>
+            <a:off x="10479713" y="5471338"/>
+            <a:ext cx="1670591" cy="1109663"/>
+          </a:xfrm>
+          <a:prstGeom prst="rect">
+            <a:avLst/>
+          </a:prstGeom>
+        </p:spPr>
+      </p:pic>
+      <p:pic>
+        <p:nvPicPr>
+          <p:cNvPr id="12" name="Picture 11" descr="A blue and grey logo&#10;&#10;Description automatically generated">
+            <a:extLst>
+              <a:ext uri="{FF2B5EF4-FFF2-40B4-BE49-F238E27FC236}">
+                <a16:creationId xmlns:a16="http://schemas.microsoft.com/office/drawing/2014/main" id="{31803A1D-0AFD-1B28-A6F0-91248D93827D}"/>
+              </a:ext>
+            </a:extLst>
+          </p:cNvPr>
+          <p:cNvPicPr>
+            <a:picLocks noChangeAspect="1"/>
+          </p:cNvPicPr>
+          <p:nvPr/>
+        </p:nvPicPr>
+        <p:blipFill>
+          <a:blip r:embed="rId5"/>
+          <a:stretch>
+            <a:fillRect/>
+          </a:stretch>
+        </p:blipFill>
+        <p:spPr>
+          <a:xfrm>
+            <a:off x="10595499" y="269621"/>
+            <a:ext cx="1294018" cy="1008723"/>
+          </a:xfrm>
+          <a:prstGeom prst="rect">
+            <a:avLst/>
+          </a:prstGeom>
+        </p:spPr>
+      </p:pic>
+      <p:sp>
+        <p:nvSpPr>
+          <p:cNvPr id="7" name="TextBox 6">
+            <a:extLst>
+              <a:ext uri="{FF2B5EF4-FFF2-40B4-BE49-F238E27FC236}">
+                <a16:creationId xmlns:a16="http://schemas.microsoft.com/office/drawing/2014/main" id="{4669976C-09EE-BE8D-639D-08ABFD04F362}"/>
+              </a:ext>
+            </a:extLst>
+          </p:cNvPr>
+          <p:cNvSpPr txBox="1"/>
+          <p:nvPr/>
+        </p:nvSpPr>
+        <p:spPr>
+          <a:xfrm>
+            <a:off x="248653" y="1687354"/>
+            <a:ext cx="9839460" cy="4616648"/>
+          </a:xfrm>
+          <a:prstGeom prst="rect">
+            <a:avLst/>
+          </a:prstGeom>
+          <a:noFill/>
+        </p:spPr>
+        <p:txBody>
+          <a:bodyPr wrap="square" rtlCol="0">
+            <a:spAutoFit/>
+          </a:bodyPr>
+          <a:lstStyle/>
+          <a:p>
+            <a:r>
+              <a:rPr lang="en-US" sz="1200" b="1" dirty="0">
+                <a:effectLst/>
+                <a:latin typeface="Helvetica Neue" panose="02000503000000020004" pitchFamily="2" charset="0"/>
+              </a:rPr>
+              <a:t>Terraform Commands: </a:t>
+            </a:r>
+          </a:p>
+          <a:p>
+            <a:endParaRPr lang="en-US" sz="1200" dirty="0">
+              <a:effectLst/>
+              <a:latin typeface="Helvetica Neue" panose="02000503000000020004" pitchFamily="2" charset="0"/>
+            </a:endParaRPr>
+          </a:p>
+          <a:p>
+            <a:r>
+              <a:rPr lang="en-US" sz="1200" dirty="0">
+                <a:effectLst/>
+                <a:latin typeface="Helvetica Neue" panose="02000503000000020004" pitchFamily="2" charset="0"/>
+              </a:rPr>
+              <a:t>Terraform </a:t>
+            </a:r>
+            <a:r>
+              <a:rPr lang="en-US" sz="1200" dirty="0" err="1">
+                <a:effectLst/>
+                <a:latin typeface="Helvetica Neue" panose="02000503000000020004" pitchFamily="2" charset="0"/>
+              </a:rPr>
+              <a:t>init</a:t>
+            </a:r>
+            <a:endParaRPr lang="en-US" sz="1200" dirty="0">
+              <a:latin typeface="Helvetica Neue" panose="02000503000000020004" pitchFamily="2" charset="0"/>
+            </a:endParaRPr>
+          </a:p>
+          <a:p>
+            <a:endParaRPr lang="en-US" sz="1200" dirty="0">
+              <a:effectLst/>
+              <a:latin typeface="Helvetica Neue" panose="02000503000000020004" pitchFamily="2" charset="0"/>
+            </a:endParaRPr>
+          </a:p>
+          <a:p>
+            <a:r>
+              <a:rPr lang="en-US" sz="1200" dirty="0">
+                <a:effectLst/>
+                <a:latin typeface="Helvetica Neue" panose="02000503000000020004" pitchFamily="2" charset="0"/>
+              </a:rPr>
+              <a:t>Terraform plan</a:t>
+            </a:r>
+          </a:p>
+          <a:p>
+            <a:endParaRPr lang="en-US" sz="1200" dirty="0">
+              <a:effectLst/>
+              <a:latin typeface="Helvetica Neue" panose="02000503000000020004" pitchFamily="2" charset="0"/>
+            </a:endParaRPr>
+          </a:p>
+          <a:p>
+            <a:r>
+              <a:rPr lang="en-US" sz="1200" dirty="0">
+                <a:effectLst/>
+                <a:latin typeface="Helvetica Neue" panose="02000503000000020004" pitchFamily="2" charset="0"/>
+              </a:rPr>
+              <a:t>Terraform apply</a:t>
+            </a:r>
+          </a:p>
+          <a:p>
+            <a:br>
+              <a:rPr lang="en-US" sz="1200" dirty="0">
+                <a:effectLst/>
+                <a:latin typeface="Helvetica Neue" panose="02000503000000020004" pitchFamily="2" charset="0"/>
+              </a:rPr>
+            </a:br>
+            <a:endParaRPr lang="en-US" sz="1200" dirty="0">
+              <a:effectLst/>
+              <a:latin typeface="Helvetica Neue" panose="02000503000000020004" pitchFamily="2" charset="0"/>
+            </a:endParaRPr>
+          </a:p>
+          <a:p>
+            <a:r>
+              <a:rPr lang="en-US" sz="1200" b="1" dirty="0">
+                <a:effectLst/>
+                <a:latin typeface="Helvetica Neue" panose="02000503000000020004" pitchFamily="2" charset="0"/>
+              </a:rPr>
+              <a:t>Docker to ECR Push Commands: (contextualized)</a:t>
+            </a:r>
+          </a:p>
+          <a:p>
+            <a:br>
+              <a:rPr lang="en-US" sz="1200" dirty="0">
+                <a:effectLst/>
+                <a:latin typeface="Helvetica Neue" panose="02000503000000020004" pitchFamily="2" charset="0"/>
+              </a:rPr>
+            </a:br>
+            <a:endParaRPr lang="en-US" sz="1200" dirty="0">
+              <a:effectLst/>
+              <a:latin typeface="Helvetica Neue" panose="02000503000000020004" pitchFamily="2" charset="0"/>
+            </a:endParaRPr>
+          </a:p>
+          <a:p>
+            <a:r>
+              <a:rPr lang="en-US" sz="1200" dirty="0" err="1">
+                <a:effectLst/>
+                <a:latin typeface="Helvetica Neue" panose="02000503000000020004" pitchFamily="2" charset="0"/>
+              </a:rPr>
+              <a:t>aws</a:t>
+            </a:r>
+            <a:r>
+              <a:rPr lang="en-US" sz="1200" dirty="0">
+                <a:effectLst/>
+                <a:latin typeface="Helvetica Neue" panose="02000503000000020004" pitchFamily="2" charset="0"/>
+              </a:rPr>
+              <a:t>  --profile=</a:t>
+            </a:r>
+            <a:r>
+              <a:rPr lang="en-US" sz="1200" dirty="0" err="1">
+                <a:effectLst/>
+                <a:latin typeface="Helvetica Neue" panose="02000503000000020004" pitchFamily="2" charset="0"/>
+              </a:rPr>
+              <a:t>ros</a:t>
+            </a:r>
+            <a:r>
+              <a:rPr lang="en-US" sz="1200" dirty="0">
+                <a:effectLst/>
+                <a:latin typeface="Helvetica Neue" panose="02000503000000020004" pitchFamily="2" charset="0"/>
+              </a:rPr>
+              <a:t>-sandbox </a:t>
+            </a:r>
+            <a:r>
+              <a:rPr lang="en-US" sz="1200" dirty="0" err="1">
+                <a:effectLst/>
+                <a:latin typeface="Helvetica Neue" panose="02000503000000020004" pitchFamily="2" charset="0"/>
+              </a:rPr>
+              <a:t>ecr</a:t>
+            </a:r>
+            <a:r>
+              <a:rPr lang="en-US" sz="1200" dirty="0">
+                <a:effectLst/>
+                <a:latin typeface="Helvetica Neue" panose="02000503000000020004" pitchFamily="2" charset="0"/>
+              </a:rPr>
+              <a:t> get-login-password --region us-east-1 | docker login --username AWS --password-stdin 088130860316.dkr.ecr.us-east-1.amazonaws.com</a:t>
+            </a:r>
+          </a:p>
+          <a:p>
+            <a:br>
+              <a:rPr lang="en-US" sz="1200" dirty="0">
+                <a:effectLst/>
+                <a:latin typeface="Helvetica Neue" panose="02000503000000020004" pitchFamily="2" charset="0"/>
+              </a:rPr>
+            </a:br>
+            <a:endParaRPr lang="en-US" sz="1200" dirty="0">
+              <a:effectLst/>
+              <a:latin typeface="Helvetica Neue" panose="02000503000000020004" pitchFamily="2" charset="0"/>
+            </a:endParaRPr>
+          </a:p>
+          <a:p>
+            <a:r>
+              <a:rPr lang="en-US" sz="1200" dirty="0">
+                <a:effectLst/>
+                <a:latin typeface="Helvetica Neue" panose="02000503000000020004" pitchFamily="2" charset="0"/>
+              </a:rPr>
+              <a:t>docker build -t r-shiny-app-runner .</a:t>
+            </a:r>
+          </a:p>
+          <a:p>
+            <a:br>
+              <a:rPr lang="en-US" sz="1200" dirty="0">
+                <a:effectLst/>
+                <a:latin typeface="Helvetica Neue" panose="02000503000000020004" pitchFamily="2" charset="0"/>
+              </a:rPr>
+            </a:br>
+            <a:endParaRPr lang="en-US" sz="1200" dirty="0">
+              <a:effectLst/>
+              <a:latin typeface="Helvetica Neue" panose="02000503000000020004" pitchFamily="2" charset="0"/>
+            </a:endParaRPr>
+          </a:p>
+          <a:p>
+            <a:r>
+              <a:rPr lang="en-US" sz="1200" dirty="0">
+                <a:effectLst/>
+                <a:latin typeface="Helvetica Neue" panose="02000503000000020004" pitchFamily="2" charset="0"/>
+              </a:rPr>
+              <a:t>docker tag </a:t>
+            </a:r>
+            <a:r>
+              <a:rPr lang="en-US" sz="1200" dirty="0" err="1">
+                <a:effectLst/>
+                <a:latin typeface="Helvetica Neue" panose="02000503000000020004" pitchFamily="2" charset="0"/>
+              </a:rPr>
+              <a:t>r-shiny-app-runner:latest</a:t>
+            </a:r>
+            <a:r>
+              <a:rPr lang="en-US" sz="1200" dirty="0">
+                <a:effectLst/>
+                <a:latin typeface="Helvetica Neue" panose="02000503000000020004" pitchFamily="2" charset="0"/>
+              </a:rPr>
+              <a:t> 088130860316.dkr.ecr.us-east-1.amazonaws.com/</a:t>
+            </a:r>
+            <a:r>
+              <a:rPr lang="en-US" sz="1200" dirty="0" err="1">
+                <a:effectLst/>
+                <a:latin typeface="Helvetica Neue" panose="02000503000000020004" pitchFamily="2" charset="0"/>
+              </a:rPr>
+              <a:t>r-shiny-app-runner:latest</a:t>
+            </a:r>
+            <a:endParaRPr lang="en-US" sz="1200" dirty="0">
+              <a:effectLst/>
+              <a:latin typeface="Helvetica Neue" panose="02000503000000020004" pitchFamily="2" charset="0"/>
+            </a:endParaRPr>
+          </a:p>
+          <a:p>
+            <a:br>
+              <a:rPr lang="en-US" sz="1200" dirty="0">
+                <a:effectLst/>
+                <a:latin typeface="Helvetica Neue" panose="02000503000000020004" pitchFamily="2" charset="0"/>
+              </a:rPr>
+            </a:br>
+            <a:endParaRPr lang="en-US" sz="1200" dirty="0">
+              <a:effectLst/>
+              <a:latin typeface="Helvetica Neue" panose="02000503000000020004" pitchFamily="2" charset="0"/>
+            </a:endParaRPr>
+          </a:p>
+          <a:p>
+            <a:r>
+              <a:rPr lang="en-US" sz="1200" dirty="0">
+                <a:effectLst/>
+                <a:latin typeface="Helvetica Neue" panose="02000503000000020004" pitchFamily="2" charset="0"/>
+              </a:rPr>
+              <a:t>docker push 088130860316.dkr.ecr.us-east-1.amazonaws.com/</a:t>
+            </a:r>
+            <a:r>
+              <a:rPr lang="en-US" sz="1200" dirty="0" err="1">
+                <a:effectLst/>
+                <a:latin typeface="Helvetica Neue" panose="02000503000000020004" pitchFamily="2" charset="0"/>
+              </a:rPr>
+              <a:t>r-shiny-app-runner:latest</a:t>
+            </a:r>
+            <a:endParaRPr lang="en-US" sz="1200" dirty="0">
+              <a:effectLst/>
+              <a:latin typeface="Helvetica Neue" panose="02000503000000020004" pitchFamily="2" charset="0"/>
+            </a:endParaRPr>
+          </a:p>
+          <a:p>
+            <a:endParaRPr lang="en-US" dirty="0"/>
+          </a:p>
+        </p:txBody>
+      </p:sp>
+    </p:spTree>
+    <p:extLst>
+      <p:ext uri="{BB962C8B-B14F-4D97-AF65-F5344CB8AC3E}">
+        <p14:creationId xmlns:p14="http://schemas.microsoft.com/office/powerpoint/2010/main" val="2730528454"/>
       </p:ext>
     </p:extLst>
   </p:cSld>

</xml_diff>